<commit_message>
tweak figs for pub quality
</commit_message>
<xml_diff>
--- a/Figures/put_map_in_NARS_barplot.pptx
+++ b/Figures/put_map_in_NARS_barplot.pptx
@@ -243,7 +243,7 @@
           <a:p>
             <a:fld id="{75EBE5B8-545A-486E-8B03-7579748D156F}" type="datetimeFigureOut">
               <a:rPr lang="en-US" smtClean="0"/>
-              <a:t>3/25/2019</a:t>
+              <a:t>4/8/2019</a:t>
             </a:fld>
             <a:endParaRPr lang="en-US"/>
           </a:p>
@@ -413,7 +413,7 @@
           <a:p>
             <a:fld id="{75EBE5B8-545A-486E-8B03-7579748D156F}" type="datetimeFigureOut">
               <a:rPr lang="en-US" smtClean="0"/>
-              <a:t>3/25/2019</a:t>
+              <a:t>4/8/2019</a:t>
             </a:fld>
             <a:endParaRPr lang="en-US"/>
           </a:p>
@@ -593,7 +593,7 @@
           <a:p>
             <a:fld id="{75EBE5B8-545A-486E-8B03-7579748D156F}" type="datetimeFigureOut">
               <a:rPr lang="en-US" smtClean="0"/>
-              <a:t>3/25/2019</a:t>
+              <a:t>4/8/2019</a:t>
             </a:fld>
             <a:endParaRPr lang="en-US"/>
           </a:p>
@@ -763,7 +763,7 @@
           <a:p>
             <a:fld id="{75EBE5B8-545A-486E-8B03-7579748D156F}" type="datetimeFigureOut">
               <a:rPr lang="en-US" smtClean="0"/>
-              <a:t>3/25/2019</a:t>
+              <a:t>4/8/2019</a:t>
             </a:fld>
             <a:endParaRPr lang="en-US"/>
           </a:p>
@@ -1007,7 +1007,7 @@
           <a:p>
             <a:fld id="{75EBE5B8-545A-486E-8B03-7579748D156F}" type="datetimeFigureOut">
               <a:rPr lang="en-US" smtClean="0"/>
-              <a:t>3/25/2019</a:t>
+              <a:t>4/8/2019</a:t>
             </a:fld>
             <a:endParaRPr lang="en-US"/>
           </a:p>
@@ -1239,7 +1239,7 @@
           <a:p>
             <a:fld id="{75EBE5B8-545A-486E-8B03-7579748D156F}" type="datetimeFigureOut">
               <a:rPr lang="en-US" smtClean="0"/>
-              <a:t>3/25/2019</a:t>
+              <a:t>4/8/2019</a:t>
             </a:fld>
             <a:endParaRPr lang="en-US"/>
           </a:p>
@@ -1606,7 +1606,7 @@
           <a:p>
             <a:fld id="{75EBE5B8-545A-486E-8B03-7579748D156F}" type="datetimeFigureOut">
               <a:rPr lang="en-US" smtClean="0"/>
-              <a:t>3/25/2019</a:t>
+              <a:t>4/8/2019</a:t>
             </a:fld>
             <a:endParaRPr lang="en-US"/>
           </a:p>
@@ -1724,7 +1724,7 @@
           <a:p>
             <a:fld id="{75EBE5B8-545A-486E-8B03-7579748D156F}" type="datetimeFigureOut">
               <a:rPr lang="en-US" smtClean="0"/>
-              <a:t>3/25/2019</a:t>
+              <a:t>4/8/2019</a:t>
             </a:fld>
             <a:endParaRPr lang="en-US"/>
           </a:p>
@@ -1819,7 +1819,7 @@
           <a:p>
             <a:fld id="{75EBE5B8-545A-486E-8B03-7579748D156F}" type="datetimeFigureOut">
               <a:rPr lang="en-US" smtClean="0"/>
-              <a:t>3/25/2019</a:t>
+              <a:t>4/8/2019</a:t>
             </a:fld>
             <a:endParaRPr lang="en-US"/>
           </a:p>
@@ -2096,7 +2096,7 @@
           <a:p>
             <a:fld id="{75EBE5B8-545A-486E-8B03-7579748D156F}" type="datetimeFigureOut">
               <a:rPr lang="en-US" smtClean="0"/>
-              <a:t>3/25/2019</a:t>
+              <a:t>4/8/2019</a:t>
             </a:fld>
             <a:endParaRPr lang="en-US"/>
           </a:p>
@@ -2353,7 +2353,7 @@
           <a:p>
             <a:fld id="{75EBE5B8-545A-486E-8B03-7579748D156F}" type="datetimeFigureOut">
               <a:rPr lang="en-US" smtClean="0"/>
-              <a:t>3/25/2019</a:t>
+              <a:t>4/8/2019</a:t>
             </a:fld>
             <a:endParaRPr lang="en-US"/>
           </a:p>
@@ -2566,7 +2566,7 @@
           <a:p>
             <a:fld id="{75EBE5B8-545A-486E-8B03-7579748D156F}" type="datetimeFigureOut">
               <a:rPr lang="en-US" smtClean="0"/>
-              <a:t>3/25/2019</a:t>
+              <a:t>4/8/2019</a:t>
             </a:fld>
             <a:endParaRPr lang="en-US"/>
           </a:p>
@@ -2973,13 +2973,13 @@
       </p:grpSpPr>
       <p:pic>
         <p:nvPicPr>
-          <p:cNvPr id="3" name="Picture 2"/>
+          <p:cNvPr id="2" name="Picture 1"/>
           <p:cNvPicPr>
             <a:picLocks noChangeAspect="1"/>
           </p:cNvPicPr>
           <p:nvPr/>
         </p:nvPicPr>
-        <p:blipFill rotWithShape="1">
+        <p:blipFill>
           <a:blip r:embed="rId2" cstate="print">
             <a:extLst>
               <a:ext uri="{28A0092B-C50C-407E-A947-70E740481C1C}">
@@ -2987,13 +2987,14 @@
               </a:ext>
             </a:extLst>
           </a:blip>
-          <a:srcRect b="4529"/>
-          <a:stretch/>
+          <a:stretch>
+            <a:fillRect/>
+          </a:stretch>
         </p:blipFill>
         <p:spPr>
           <a:xfrm>
-            <a:off x="457196" y="218656"/>
-            <a:ext cx="4114808" cy="5237928"/>
+            <a:off x="460273" y="168959"/>
+            <a:ext cx="4114808" cy="5486411"/>
           </a:xfrm>
           <a:prstGeom prst="rect">
             <a:avLst/>
@@ -3021,8 +3022,8 @@
         </p:blipFill>
         <p:spPr>
           <a:xfrm>
-            <a:off x="944217" y="3306605"/>
-            <a:ext cx="2729477" cy="1195822"/>
+            <a:off x="904461" y="3287530"/>
+            <a:ext cx="2773017" cy="1214897"/>
           </a:xfrm>
           <a:prstGeom prst="rect">
             <a:avLst/>

</xml_diff>

<commit_message>
update barplot axis order
</commit_message>
<xml_diff>
--- a/Figures/put_map_in_NARS_barplot.pptx
+++ b/Figures/put_map_in_NARS_barplot.pptx
@@ -243,7 +243,7 @@
           <a:p>
             <a:fld id="{75EBE5B8-545A-486E-8B03-7579748D156F}" type="datetimeFigureOut">
               <a:rPr lang="en-US" smtClean="0"/>
-              <a:t>4/8/2019</a:t>
+              <a:t>4/10/2019</a:t>
             </a:fld>
             <a:endParaRPr lang="en-US"/>
           </a:p>
@@ -413,7 +413,7 @@
           <a:p>
             <a:fld id="{75EBE5B8-545A-486E-8B03-7579748D156F}" type="datetimeFigureOut">
               <a:rPr lang="en-US" smtClean="0"/>
-              <a:t>4/8/2019</a:t>
+              <a:t>4/10/2019</a:t>
             </a:fld>
             <a:endParaRPr lang="en-US"/>
           </a:p>
@@ -593,7 +593,7 @@
           <a:p>
             <a:fld id="{75EBE5B8-545A-486E-8B03-7579748D156F}" type="datetimeFigureOut">
               <a:rPr lang="en-US" smtClean="0"/>
-              <a:t>4/8/2019</a:t>
+              <a:t>4/10/2019</a:t>
             </a:fld>
             <a:endParaRPr lang="en-US"/>
           </a:p>
@@ -763,7 +763,7 @@
           <a:p>
             <a:fld id="{75EBE5B8-545A-486E-8B03-7579748D156F}" type="datetimeFigureOut">
               <a:rPr lang="en-US" smtClean="0"/>
-              <a:t>4/8/2019</a:t>
+              <a:t>4/10/2019</a:t>
             </a:fld>
             <a:endParaRPr lang="en-US"/>
           </a:p>
@@ -1007,7 +1007,7 @@
           <a:p>
             <a:fld id="{75EBE5B8-545A-486E-8B03-7579748D156F}" type="datetimeFigureOut">
               <a:rPr lang="en-US" smtClean="0"/>
-              <a:t>4/8/2019</a:t>
+              <a:t>4/10/2019</a:t>
             </a:fld>
             <a:endParaRPr lang="en-US"/>
           </a:p>
@@ -1239,7 +1239,7 @@
           <a:p>
             <a:fld id="{75EBE5B8-545A-486E-8B03-7579748D156F}" type="datetimeFigureOut">
               <a:rPr lang="en-US" smtClean="0"/>
-              <a:t>4/8/2019</a:t>
+              <a:t>4/10/2019</a:t>
             </a:fld>
             <a:endParaRPr lang="en-US"/>
           </a:p>
@@ -1606,7 +1606,7 @@
           <a:p>
             <a:fld id="{75EBE5B8-545A-486E-8B03-7579748D156F}" type="datetimeFigureOut">
               <a:rPr lang="en-US" smtClean="0"/>
-              <a:t>4/8/2019</a:t>
+              <a:t>4/10/2019</a:t>
             </a:fld>
             <a:endParaRPr lang="en-US"/>
           </a:p>
@@ -1724,7 +1724,7 @@
           <a:p>
             <a:fld id="{75EBE5B8-545A-486E-8B03-7579748D156F}" type="datetimeFigureOut">
               <a:rPr lang="en-US" smtClean="0"/>
-              <a:t>4/8/2019</a:t>
+              <a:t>4/10/2019</a:t>
             </a:fld>
             <a:endParaRPr lang="en-US"/>
           </a:p>
@@ -1819,7 +1819,7 @@
           <a:p>
             <a:fld id="{75EBE5B8-545A-486E-8B03-7579748D156F}" type="datetimeFigureOut">
               <a:rPr lang="en-US" smtClean="0"/>
-              <a:t>4/8/2019</a:t>
+              <a:t>4/10/2019</a:t>
             </a:fld>
             <a:endParaRPr lang="en-US"/>
           </a:p>
@@ -2096,7 +2096,7 @@
           <a:p>
             <a:fld id="{75EBE5B8-545A-486E-8B03-7579748D156F}" type="datetimeFigureOut">
               <a:rPr lang="en-US" smtClean="0"/>
-              <a:t>4/8/2019</a:t>
+              <a:t>4/10/2019</a:t>
             </a:fld>
             <a:endParaRPr lang="en-US"/>
           </a:p>
@@ -2353,7 +2353,7 @@
           <a:p>
             <a:fld id="{75EBE5B8-545A-486E-8B03-7579748D156F}" type="datetimeFigureOut">
               <a:rPr lang="en-US" smtClean="0"/>
-              <a:t>4/8/2019</a:t>
+              <a:t>4/10/2019</a:t>
             </a:fld>
             <a:endParaRPr lang="en-US"/>
           </a:p>
@@ -2566,7 +2566,7 @@
           <a:p>
             <a:fld id="{75EBE5B8-545A-486E-8B03-7579748D156F}" type="datetimeFigureOut">
               <a:rPr lang="en-US" smtClean="0"/>
-              <a:t>4/8/2019</a:t>
+              <a:t>4/10/2019</a:t>
             </a:fld>
             <a:endParaRPr lang="en-US"/>
           </a:p>
@@ -2973,7 +2973,7 @@
       </p:grpSpPr>
       <p:pic>
         <p:nvPicPr>
-          <p:cNvPr id="2" name="Picture 1"/>
+          <p:cNvPr id="3" name="Picture 2"/>
           <p:cNvPicPr>
             <a:picLocks noChangeAspect="1"/>
           </p:cNvPicPr>
@@ -2993,7 +2993,7 @@
         </p:blipFill>
         <p:spPr>
           <a:xfrm>
-            <a:off x="460273" y="168959"/>
+            <a:off x="2514596" y="685794"/>
             <a:ext cx="4114808" cy="5486411"/>
           </a:xfrm>
           <a:prstGeom prst="rect">
@@ -3022,8 +3022,37 @@
         </p:blipFill>
         <p:spPr>
           <a:xfrm>
-            <a:off x="904461" y="3287530"/>
+            <a:off x="3756992" y="3734791"/>
             <a:ext cx="2773017" cy="1214897"/>
+          </a:xfrm>
+          <a:prstGeom prst="rect">
+            <a:avLst/>
+          </a:prstGeom>
+        </p:spPr>
+      </p:pic>
+      <p:pic>
+        <p:nvPicPr>
+          <p:cNvPr id="4" name="Picture 3"/>
+          <p:cNvPicPr>
+            <a:picLocks noChangeAspect="1"/>
+          </p:cNvPicPr>
+          <p:nvPr/>
+        </p:nvPicPr>
+        <p:blipFill rotWithShape="1">
+          <a:blip r:embed="rId4" cstate="print">
+            <a:extLst>
+              <a:ext uri="{28A0092B-C50C-407E-A947-70E740481C1C}">
+                <a14:useLocalDpi xmlns:a14="http://schemas.microsoft.com/office/drawing/2010/main" val="0"/>
+              </a:ext>
+            </a:extLst>
+          </a:blip>
+          <a:srcRect l="27609" t="9710" r="27609" b="13189"/>
+          <a:stretch/>
+        </p:blipFill>
+        <p:spPr>
+          <a:xfrm>
+            <a:off x="2524538" y="665922"/>
+            <a:ext cx="4094923" cy="5287617"/>
           </a:xfrm>
           <a:prstGeom prst="rect">
             <a:avLst/>

</xml_diff>